<commit_message>
add new coordinate image 1mm and 1.5mm
</commit_message>
<xml_diff>
--- a/GraspTest/CoordinateCalibration/CoordinateImage/新建 Microsoft PowerPoint 演示文稿.pptx
+++ b/GraspTest/CoordinateCalibration/CoordinateImage/新建 Microsoft PowerPoint 演示文稿.pptx
@@ -6,6 +6,11 @@
   </p:sldMasterIdLst>
   <p:sldIdLst>
     <p:sldId id="256" r:id="rId2"/>
+    <p:sldId id="257" r:id="rId3"/>
+    <p:sldId id="258" r:id="rId4"/>
+    <p:sldId id="259" r:id="rId5"/>
+    <p:sldId id="260" r:id="rId6"/>
+    <p:sldId id="261" r:id="rId7"/>
   </p:sldIdLst>
   <p:sldSz cx="12192000" cy="6858000"/>
   <p:notesSz cx="6858000" cy="9144000"/>
@@ -259,7 +264,7 @@
           <a:p>
             <a:fld id="{DBAE59ED-C1C3-42F4-821F-E45A021EEBB0}" type="datetimeFigureOut">
               <a:rPr lang="zh-CN" altLang="en-US" smtClean="0"/>
-              <a:t>2018/3/16</a:t>
+              <a:t>2018/3/17</a:t>
             </a:fld>
             <a:endParaRPr lang="zh-CN" altLang="en-US"/>
           </a:p>
@@ -457,7 +462,7 @@
           <a:p>
             <a:fld id="{DBAE59ED-C1C3-42F4-821F-E45A021EEBB0}" type="datetimeFigureOut">
               <a:rPr lang="zh-CN" altLang="en-US" smtClean="0"/>
-              <a:t>2018/3/16</a:t>
+              <a:t>2018/3/17</a:t>
             </a:fld>
             <a:endParaRPr lang="zh-CN" altLang="en-US"/>
           </a:p>
@@ -665,7 +670,7 @@
           <a:p>
             <a:fld id="{DBAE59ED-C1C3-42F4-821F-E45A021EEBB0}" type="datetimeFigureOut">
               <a:rPr lang="zh-CN" altLang="en-US" smtClean="0"/>
-              <a:t>2018/3/16</a:t>
+              <a:t>2018/3/17</a:t>
             </a:fld>
             <a:endParaRPr lang="zh-CN" altLang="en-US"/>
           </a:p>
@@ -863,7 +868,7 @@
           <a:p>
             <a:fld id="{DBAE59ED-C1C3-42F4-821F-E45A021EEBB0}" type="datetimeFigureOut">
               <a:rPr lang="zh-CN" altLang="en-US" smtClean="0"/>
-              <a:t>2018/3/16</a:t>
+              <a:t>2018/3/17</a:t>
             </a:fld>
             <a:endParaRPr lang="zh-CN" altLang="en-US"/>
           </a:p>
@@ -1138,7 +1143,7 @@
           <a:p>
             <a:fld id="{DBAE59ED-C1C3-42F4-821F-E45A021EEBB0}" type="datetimeFigureOut">
               <a:rPr lang="zh-CN" altLang="en-US" smtClean="0"/>
-              <a:t>2018/3/16</a:t>
+              <a:t>2018/3/17</a:t>
             </a:fld>
             <a:endParaRPr lang="zh-CN" altLang="en-US"/>
           </a:p>
@@ -1403,7 +1408,7 @@
           <a:p>
             <a:fld id="{DBAE59ED-C1C3-42F4-821F-E45A021EEBB0}" type="datetimeFigureOut">
               <a:rPr lang="zh-CN" altLang="en-US" smtClean="0"/>
-              <a:t>2018/3/16</a:t>
+              <a:t>2018/3/17</a:t>
             </a:fld>
             <a:endParaRPr lang="zh-CN" altLang="en-US"/>
           </a:p>
@@ -1815,7 +1820,7 @@
           <a:p>
             <a:fld id="{DBAE59ED-C1C3-42F4-821F-E45A021EEBB0}" type="datetimeFigureOut">
               <a:rPr lang="zh-CN" altLang="en-US" smtClean="0"/>
-              <a:t>2018/3/16</a:t>
+              <a:t>2018/3/17</a:t>
             </a:fld>
             <a:endParaRPr lang="zh-CN" altLang="en-US"/>
           </a:p>
@@ -1956,7 +1961,7 @@
           <a:p>
             <a:fld id="{DBAE59ED-C1C3-42F4-821F-E45A021EEBB0}" type="datetimeFigureOut">
               <a:rPr lang="zh-CN" altLang="en-US" smtClean="0"/>
-              <a:t>2018/3/16</a:t>
+              <a:t>2018/3/17</a:t>
             </a:fld>
             <a:endParaRPr lang="zh-CN" altLang="en-US"/>
           </a:p>
@@ -2069,7 +2074,7 @@
           <a:p>
             <a:fld id="{DBAE59ED-C1C3-42F4-821F-E45A021EEBB0}" type="datetimeFigureOut">
               <a:rPr lang="zh-CN" altLang="en-US" smtClean="0"/>
-              <a:t>2018/3/16</a:t>
+              <a:t>2018/3/17</a:t>
             </a:fld>
             <a:endParaRPr lang="zh-CN" altLang="en-US"/>
           </a:p>
@@ -2380,7 +2385,7 @@
           <a:p>
             <a:fld id="{DBAE59ED-C1C3-42F4-821F-E45A021EEBB0}" type="datetimeFigureOut">
               <a:rPr lang="zh-CN" altLang="en-US" smtClean="0"/>
-              <a:t>2018/3/16</a:t>
+              <a:t>2018/3/17</a:t>
             </a:fld>
             <a:endParaRPr lang="zh-CN" altLang="en-US"/>
           </a:p>
@@ -2668,7 +2673,7 @@
           <a:p>
             <a:fld id="{DBAE59ED-C1C3-42F4-821F-E45A021EEBB0}" type="datetimeFigureOut">
               <a:rPr lang="zh-CN" altLang="en-US" smtClean="0"/>
-              <a:t>2018/3/16</a:t>
+              <a:t>2018/3/17</a:t>
             </a:fld>
             <a:endParaRPr lang="zh-CN" altLang="en-US"/>
           </a:p>
@@ -2909,7 +2914,7 @@
           <a:p>
             <a:fld id="{DBAE59ED-C1C3-42F4-821F-E45A021EEBB0}" type="datetimeFigureOut">
               <a:rPr lang="zh-CN" altLang="en-US" smtClean="0"/>
-              <a:t>2018/3/16</a:t>
+              <a:t>2018/3/17</a:t>
             </a:fld>
             <a:endParaRPr lang="zh-CN" altLang="en-US"/>
           </a:p>
@@ -3857,10 +3862,2419 @@
           </p:style>
         </p:cxnSp>
       </p:grpSp>
+      <p:sp>
+        <p:nvSpPr>
+          <p:cNvPr id="6" name="文本框 5">
+            <a:extLst>
+              <a:ext uri="{FF2B5EF4-FFF2-40B4-BE49-F238E27FC236}">
+                <a16:creationId xmlns:a16="http://schemas.microsoft.com/office/drawing/2014/main" id="{590A3EA1-AC70-4F5D-93A5-687B5E865A91}"/>
+              </a:ext>
+            </a:extLst>
+          </p:cNvPr>
+          <p:cNvSpPr txBox="1"/>
+          <p:nvPr/>
+        </p:nvSpPr>
+        <p:spPr>
+          <a:xfrm>
+            <a:off x="1544320" y="1735680"/>
+            <a:ext cx="2523123" cy="646331"/>
+          </a:xfrm>
+          <a:prstGeom prst="rect">
+            <a:avLst/>
+          </a:prstGeom>
+          <a:noFill/>
+        </p:spPr>
+        <p:txBody>
+          <a:bodyPr wrap="square" rtlCol="0">
+            <a:spAutoFit/>
+          </a:bodyPr>
+          <a:lstStyle/>
+          <a:p>
+            <a:r>
+              <a:rPr lang="en-US" altLang="zh-CN" dirty="0"/>
+              <a:t>2mm</a:t>
+            </a:r>
+            <a:r>
+              <a:rPr lang="zh-CN" altLang="en-US" dirty="0"/>
+              <a:t>线宽 圆形</a:t>
+            </a:r>
+            <a:r>
+              <a:rPr lang="en-US" altLang="zh-CN" dirty="0"/>
+              <a:t>+</a:t>
+            </a:r>
+            <a:r>
+              <a:rPr lang="zh-CN" altLang="en-US" dirty="0"/>
+              <a:t>十字</a:t>
+            </a:r>
+            <a:endParaRPr lang="en-US" altLang="zh-CN" dirty="0"/>
+          </a:p>
+          <a:p>
+            <a:r>
+              <a:rPr lang="zh-CN" altLang="en-US" dirty="0"/>
+              <a:t>最下半径</a:t>
+            </a:r>
+            <a:r>
+              <a:rPr lang="en-US" altLang="zh-CN" dirty="0"/>
+              <a:t>3cm</a:t>
+            </a:r>
+            <a:endParaRPr lang="zh-CN" altLang="en-US" dirty="0"/>
+          </a:p>
+        </p:txBody>
+      </p:sp>
     </p:spTree>
     <p:extLst>
       <p:ext uri="{BB962C8B-B14F-4D97-AF65-F5344CB8AC3E}">
         <p14:creationId xmlns:p14="http://schemas.microsoft.com/office/powerpoint/2010/main" val="1370484775"/>
+      </p:ext>
+    </p:extLst>
+  </p:cSld>
+  <p:clrMapOvr>
+    <a:masterClrMapping/>
+  </p:clrMapOvr>
+</p:sld>
+</file>
+
+<file path=ppt/slides/slide2.xml><?xml version="1.0" encoding="utf-8"?>
+<p:sld xmlns:a="http://schemas.openxmlformats.org/drawingml/2006/main" xmlns:r="http://schemas.openxmlformats.org/officeDocument/2006/relationships" xmlns:p="http://schemas.openxmlformats.org/presentationml/2006/main">
+  <p:cSld>
+    <p:spTree>
+      <p:nvGrpSpPr>
+        <p:cNvPr id="1" name=""/>
+        <p:cNvGrpSpPr/>
+        <p:nvPr/>
+      </p:nvGrpSpPr>
+      <p:grpSpPr>
+        <a:xfrm>
+          <a:off x="0" y="0"/>
+          <a:ext cx="0" cy="0"/>
+          <a:chOff x="0" y="0"/>
+          <a:chExt cx="0" cy="0"/>
+        </a:xfrm>
+      </p:grpSpPr>
+      <p:grpSp>
+        <p:nvGrpSpPr>
+          <p:cNvPr id="5" name="组合 4">
+            <a:extLst>
+              <a:ext uri="{FF2B5EF4-FFF2-40B4-BE49-F238E27FC236}">
+                <a16:creationId xmlns:a16="http://schemas.microsoft.com/office/drawing/2014/main" id="{41826B96-3954-4EBA-A35B-6FEC9762CB93}"/>
+              </a:ext>
+            </a:extLst>
+          </p:cNvPr>
+          <p:cNvGrpSpPr/>
+          <p:nvPr/>
+        </p:nvGrpSpPr>
+        <p:grpSpPr>
+          <a:xfrm>
+            <a:off x="5147442" y="529680"/>
+            <a:ext cx="5974080" cy="4572000"/>
+            <a:chOff x="5147442" y="529680"/>
+            <a:chExt cx="5974080" cy="4572000"/>
+          </a:xfrm>
+        </p:grpSpPr>
+        <p:sp>
+          <p:nvSpPr>
+            <p:cNvPr id="7" name="矩形 6">
+              <a:extLst>
+                <a:ext uri="{FF2B5EF4-FFF2-40B4-BE49-F238E27FC236}">
+                  <a16:creationId xmlns:a16="http://schemas.microsoft.com/office/drawing/2014/main" id="{61AD18E2-0F08-41F9-8739-EBB3CE6A12D2}"/>
+                </a:ext>
+              </a:extLst>
+            </p:cNvPr>
+            <p:cNvSpPr/>
+            <p:nvPr/>
+          </p:nvSpPr>
+          <p:spPr>
+            <a:xfrm>
+              <a:off x="5147442" y="529680"/>
+              <a:ext cx="5974080" cy="4572000"/>
+            </a:xfrm>
+            <a:prstGeom prst="rect">
+              <a:avLst/>
+            </a:prstGeom>
+            <a:solidFill>
+              <a:schemeClr val="bg1"/>
+            </a:solidFill>
+            <a:ln>
+              <a:solidFill>
+                <a:schemeClr val="tx1"/>
+              </a:solidFill>
+            </a:ln>
+          </p:spPr>
+          <p:style>
+            <a:lnRef idx="2">
+              <a:schemeClr val="accent1">
+                <a:shade val="50000"/>
+              </a:schemeClr>
+            </a:lnRef>
+            <a:fillRef idx="1">
+              <a:schemeClr val="accent1"/>
+            </a:fillRef>
+            <a:effectRef idx="0">
+              <a:schemeClr val="accent1"/>
+            </a:effectRef>
+            <a:fontRef idx="minor">
+              <a:schemeClr val="lt1"/>
+            </a:fontRef>
+          </p:style>
+          <p:txBody>
+            <a:bodyPr rtlCol="0" anchor="ctr"/>
+            <a:lstStyle/>
+            <a:p>
+              <a:pPr algn="ctr"/>
+              <a:endParaRPr lang="zh-CN" altLang="en-US"/>
+            </a:p>
+          </p:txBody>
+        </p:sp>
+        <p:grpSp>
+          <p:nvGrpSpPr>
+            <p:cNvPr id="3" name="组合 2">
+              <a:extLst>
+                <a:ext uri="{FF2B5EF4-FFF2-40B4-BE49-F238E27FC236}">
+                  <a16:creationId xmlns:a16="http://schemas.microsoft.com/office/drawing/2014/main" id="{8B0E0C65-CD8B-4DC7-AD47-1BB1E7803ADD}"/>
+                </a:ext>
+              </a:extLst>
+            </p:cNvPr>
+            <p:cNvGrpSpPr/>
+            <p:nvPr/>
+          </p:nvGrpSpPr>
+          <p:grpSpPr>
+            <a:xfrm>
+              <a:off x="6334482" y="1015680"/>
+              <a:ext cx="3600000" cy="3600000"/>
+              <a:chOff x="0" y="0"/>
+              <a:chExt cx="3600000" cy="3600000"/>
+            </a:xfrm>
+          </p:grpSpPr>
+          <p:grpSp>
+            <p:nvGrpSpPr>
+              <p:cNvPr id="2" name="组合 1">
+                <a:extLst>
+                  <a:ext uri="{FF2B5EF4-FFF2-40B4-BE49-F238E27FC236}">
+                    <a16:creationId xmlns:a16="http://schemas.microsoft.com/office/drawing/2014/main" id="{ADA7DA4E-CB55-4913-87E5-FC6AF0E90EC7}"/>
+                  </a:ext>
+                </a:extLst>
+              </p:cNvPr>
+              <p:cNvGrpSpPr/>
+              <p:nvPr/>
+            </p:nvGrpSpPr>
+            <p:grpSpPr>
+              <a:xfrm>
+                <a:off x="0" y="0"/>
+                <a:ext cx="3600000" cy="3600000"/>
+                <a:chOff x="0" y="0"/>
+                <a:chExt cx="3600000" cy="3600000"/>
+              </a:xfrm>
+            </p:grpSpPr>
+            <p:sp>
+              <p:nvSpPr>
+                <p:cNvPr id="4" name="流程图: 接点 3">
+                  <a:extLst>
+                    <a:ext uri="{FF2B5EF4-FFF2-40B4-BE49-F238E27FC236}">
+                      <a16:creationId xmlns:a16="http://schemas.microsoft.com/office/drawing/2014/main" id="{3CC3B8DD-BF4F-46D2-B9D5-6E2F4C693C28}"/>
+                    </a:ext>
+                  </a:extLst>
+                </p:cNvPr>
+                <p:cNvSpPr/>
+                <p:nvPr/>
+              </p:nvSpPr>
+              <p:spPr>
+                <a:xfrm>
+                  <a:off x="0" y="0"/>
+                  <a:ext cx="3600000" cy="3600000"/>
+                </a:xfrm>
+                <a:prstGeom prst="flowChartConnector">
+                  <a:avLst/>
+                </a:prstGeom>
+                <a:noFill/>
+                <a:ln w="50800">
+                  <a:solidFill>
+                    <a:schemeClr val="tx1"/>
+                  </a:solidFill>
+                </a:ln>
+              </p:spPr>
+              <p:style>
+                <a:lnRef idx="2">
+                  <a:schemeClr val="accent1">
+                    <a:shade val="50000"/>
+                  </a:schemeClr>
+                </a:lnRef>
+                <a:fillRef idx="1">
+                  <a:schemeClr val="accent1"/>
+                </a:fillRef>
+                <a:effectRef idx="0">
+                  <a:schemeClr val="accent1"/>
+                </a:effectRef>
+                <a:fontRef idx="minor">
+                  <a:schemeClr val="lt1"/>
+                </a:fontRef>
+              </p:style>
+              <p:txBody>
+                <a:bodyPr rtlCol="0" anchor="ctr"/>
+                <a:lstStyle/>
+                <a:p>
+                  <a:pPr algn="ctr"/>
+                  <a:endParaRPr lang="zh-CN" altLang="en-US"/>
+                </a:p>
+              </p:txBody>
+            </p:sp>
+            <p:sp>
+              <p:nvSpPr>
+                <p:cNvPr id="9" name="流程图: 接点 8">
+                  <a:extLst>
+                    <a:ext uri="{FF2B5EF4-FFF2-40B4-BE49-F238E27FC236}">
+                      <a16:creationId xmlns:a16="http://schemas.microsoft.com/office/drawing/2014/main" id="{C01A70EB-F916-4695-88EC-7129624952EC}"/>
+                    </a:ext>
+                  </a:extLst>
+                </p:cNvPr>
+                <p:cNvSpPr/>
+                <p:nvPr/>
+              </p:nvSpPr>
+              <p:spPr>
+                <a:xfrm>
+                  <a:off x="360000" y="360000"/>
+                  <a:ext cx="2880000" cy="2880000"/>
+                </a:xfrm>
+                <a:prstGeom prst="flowChartConnector">
+                  <a:avLst/>
+                </a:prstGeom>
+                <a:noFill/>
+                <a:ln w="50800">
+                  <a:solidFill>
+                    <a:schemeClr val="tx1"/>
+                  </a:solidFill>
+                </a:ln>
+              </p:spPr>
+              <p:style>
+                <a:lnRef idx="2">
+                  <a:schemeClr val="accent1">
+                    <a:shade val="50000"/>
+                  </a:schemeClr>
+                </a:lnRef>
+                <a:fillRef idx="1">
+                  <a:schemeClr val="accent1"/>
+                </a:fillRef>
+                <a:effectRef idx="0">
+                  <a:schemeClr val="accent1"/>
+                </a:effectRef>
+                <a:fontRef idx="minor">
+                  <a:schemeClr val="lt1"/>
+                </a:fontRef>
+              </p:style>
+              <p:txBody>
+                <a:bodyPr rtlCol="0" anchor="ctr"/>
+                <a:lstStyle/>
+                <a:p>
+                  <a:pPr algn="ctr"/>
+                  <a:endParaRPr lang="zh-CN" altLang="en-US"/>
+                </a:p>
+              </p:txBody>
+            </p:sp>
+            <p:sp>
+              <p:nvSpPr>
+                <p:cNvPr id="10" name="流程图: 接点 9">
+                  <a:extLst>
+                    <a:ext uri="{FF2B5EF4-FFF2-40B4-BE49-F238E27FC236}">
+                      <a16:creationId xmlns:a16="http://schemas.microsoft.com/office/drawing/2014/main" id="{4210E950-9BB1-4978-A57E-C78DEF55612C}"/>
+                    </a:ext>
+                  </a:extLst>
+                </p:cNvPr>
+                <p:cNvSpPr/>
+                <p:nvPr/>
+              </p:nvSpPr>
+              <p:spPr>
+                <a:xfrm>
+                  <a:off x="720000" y="720000"/>
+                  <a:ext cx="2160000" cy="2160000"/>
+                </a:xfrm>
+                <a:prstGeom prst="flowChartConnector">
+                  <a:avLst/>
+                </a:prstGeom>
+                <a:noFill/>
+                <a:ln w="50800">
+                  <a:solidFill>
+                    <a:schemeClr val="tx1"/>
+                  </a:solidFill>
+                </a:ln>
+              </p:spPr>
+              <p:style>
+                <a:lnRef idx="2">
+                  <a:schemeClr val="accent1">
+                    <a:shade val="50000"/>
+                  </a:schemeClr>
+                </a:lnRef>
+                <a:fillRef idx="1">
+                  <a:schemeClr val="accent1"/>
+                </a:fillRef>
+                <a:effectRef idx="0">
+                  <a:schemeClr val="accent1"/>
+                </a:effectRef>
+                <a:fontRef idx="minor">
+                  <a:schemeClr val="lt1"/>
+                </a:fontRef>
+              </p:style>
+              <p:txBody>
+                <a:bodyPr rtlCol="0" anchor="ctr"/>
+                <a:lstStyle/>
+                <a:p>
+                  <a:pPr algn="ctr"/>
+                  <a:endParaRPr lang="zh-CN" altLang="en-US"/>
+                </a:p>
+              </p:txBody>
+            </p:sp>
+            <p:sp>
+              <p:nvSpPr>
+                <p:cNvPr id="11" name="流程图: 接点 10">
+                  <a:extLst>
+                    <a:ext uri="{FF2B5EF4-FFF2-40B4-BE49-F238E27FC236}">
+                      <a16:creationId xmlns:a16="http://schemas.microsoft.com/office/drawing/2014/main" id="{91DABCCD-C021-478B-84AE-1F3868C74A54}"/>
+                    </a:ext>
+                  </a:extLst>
+                </p:cNvPr>
+                <p:cNvSpPr/>
+                <p:nvPr/>
+              </p:nvSpPr>
+              <p:spPr>
+                <a:xfrm>
+                  <a:off x="1080000" y="1080000"/>
+                  <a:ext cx="1440000" cy="1440000"/>
+                </a:xfrm>
+                <a:prstGeom prst="flowChartConnector">
+                  <a:avLst/>
+                </a:prstGeom>
+                <a:noFill/>
+                <a:ln w="50800">
+                  <a:solidFill>
+                    <a:schemeClr val="tx1"/>
+                  </a:solidFill>
+                </a:ln>
+              </p:spPr>
+              <p:style>
+                <a:lnRef idx="2">
+                  <a:schemeClr val="accent1">
+                    <a:shade val="50000"/>
+                  </a:schemeClr>
+                </a:lnRef>
+                <a:fillRef idx="1">
+                  <a:schemeClr val="accent1"/>
+                </a:fillRef>
+                <a:effectRef idx="0">
+                  <a:schemeClr val="accent1"/>
+                </a:effectRef>
+                <a:fontRef idx="minor">
+                  <a:schemeClr val="lt1"/>
+                </a:fontRef>
+              </p:style>
+              <p:txBody>
+                <a:bodyPr rtlCol="0" anchor="ctr"/>
+                <a:lstStyle/>
+                <a:p>
+                  <a:pPr algn="ctr"/>
+                  <a:endParaRPr lang="zh-CN" altLang="en-US"/>
+                </a:p>
+              </p:txBody>
+            </p:sp>
+            <p:sp>
+              <p:nvSpPr>
+                <p:cNvPr id="12" name="流程图: 接点 11">
+                  <a:extLst>
+                    <a:ext uri="{FF2B5EF4-FFF2-40B4-BE49-F238E27FC236}">
+                      <a16:creationId xmlns:a16="http://schemas.microsoft.com/office/drawing/2014/main" id="{F905332C-E351-478D-AF32-8CFCBAF5D076}"/>
+                    </a:ext>
+                  </a:extLst>
+                </p:cNvPr>
+                <p:cNvSpPr/>
+                <p:nvPr/>
+              </p:nvSpPr>
+              <p:spPr>
+                <a:xfrm>
+                  <a:off x="1440000" y="1440000"/>
+                  <a:ext cx="720000" cy="720000"/>
+                </a:xfrm>
+                <a:prstGeom prst="flowChartConnector">
+                  <a:avLst/>
+                </a:prstGeom>
+                <a:noFill/>
+                <a:ln w="50800">
+                  <a:solidFill>
+                    <a:schemeClr val="tx1"/>
+                  </a:solidFill>
+                </a:ln>
+              </p:spPr>
+              <p:style>
+                <a:lnRef idx="2">
+                  <a:schemeClr val="accent1">
+                    <a:shade val="50000"/>
+                  </a:schemeClr>
+                </a:lnRef>
+                <a:fillRef idx="1">
+                  <a:schemeClr val="accent1"/>
+                </a:fillRef>
+                <a:effectRef idx="0">
+                  <a:schemeClr val="accent1"/>
+                </a:effectRef>
+                <a:fontRef idx="minor">
+                  <a:schemeClr val="lt1"/>
+                </a:fontRef>
+              </p:style>
+              <p:txBody>
+                <a:bodyPr rtlCol="0" anchor="ctr"/>
+                <a:lstStyle/>
+                <a:p>
+                  <a:pPr algn="ctr"/>
+                  <a:endParaRPr lang="zh-CN" altLang="en-US"/>
+                </a:p>
+              </p:txBody>
+            </p:sp>
+          </p:grpSp>
+          <p:sp>
+            <p:nvSpPr>
+              <p:cNvPr id="13" name="流程图: 接点 12">
+                <a:extLst>
+                  <a:ext uri="{FF2B5EF4-FFF2-40B4-BE49-F238E27FC236}">
+                    <a16:creationId xmlns:a16="http://schemas.microsoft.com/office/drawing/2014/main" id="{62AB4E7B-BED3-4F34-9095-EBFD76AFC7FE}"/>
+                  </a:ext>
+                </a:extLst>
+              </p:cNvPr>
+              <p:cNvSpPr/>
+              <p:nvPr/>
+            </p:nvSpPr>
+            <p:spPr>
+              <a:xfrm>
+                <a:off x="1746000" y="1746000"/>
+                <a:ext cx="108000" cy="108000"/>
+              </a:xfrm>
+              <a:prstGeom prst="flowChartConnector">
+                <a:avLst/>
+              </a:prstGeom>
+              <a:noFill/>
+              <a:ln w="50800">
+                <a:solidFill>
+                  <a:schemeClr val="tx1"/>
+                </a:solidFill>
+              </a:ln>
+            </p:spPr>
+            <p:style>
+              <a:lnRef idx="2">
+                <a:schemeClr val="accent1">
+                  <a:shade val="50000"/>
+                </a:schemeClr>
+              </a:lnRef>
+              <a:fillRef idx="1">
+                <a:schemeClr val="accent1"/>
+              </a:fillRef>
+              <a:effectRef idx="0">
+                <a:schemeClr val="accent1"/>
+              </a:effectRef>
+              <a:fontRef idx="minor">
+                <a:schemeClr val="lt1"/>
+              </a:fontRef>
+            </p:style>
+            <p:txBody>
+              <a:bodyPr rtlCol="0" anchor="ctr"/>
+              <a:lstStyle/>
+              <a:p>
+                <a:pPr algn="ctr"/>
+                <a:endParaRPr lang="zh-CN" altLang="en-US"/>
+              </a:p>
+            </p:txBody>
+          </p:sp>
+        </p:grpSp>
+      </p:grpSp>
+      <p:sp>
+        <p:nvSpPr>
+          <p:cNvPr id="15" name="文本框 14">
+            <a:extLst>
+              <a:ext uri="{FF2B5EF4-FFF2-40B4-BE49-F238E27FC236}">
+                <a16:creationId xmlns:a16="http://schemas.microsoft.com/office/drawing/2014/main" id="{E1986432-EBE2-4C7D-9BD0-946A1DE43E5D}"/>
+              </a:ext>
+            </a:extLst>
+          </p:cNvPr>
+          <p:cNvSpPr txBox="1"/>
+          <p:nvPr/>
+        </p:nvSpPr>
+        <p:spPr>
+          <a:xfrm>
+            <a:off x="1544320" y="1735680"/>
+            <a:ext cx="2523123" cy="646331"/>
+          </a:xfrm>
+          <a:prstGeom prst="rect">
+            <a:avLst/>
+          </a:prstGeom>
+          <a:noFill/>
+        </p:spPr>
+        <p:txBody>
+          <a:bodyPr wrap="square" rtlCol="0">
+            <a:spAutoFit/>
+          </a:bodyPr>
+          <a:lstStyle/>
+          <a:p>
+            <a:r>
+              <a:rPr lang="en-US" altLang="zh-CN" dirty="0"/>
+              <a:t>2mm</a:t>
+            </a:r>
+            <a:r>
+              <a:rPr lang="zh-CN" altLang="en-US" dirty="0"/>
+              <a:t>线宽 圆形</a:t>
+            </a:r>
+            <a:endParaRPr lang="en-US" altLang="zh-CN" dirty="0"/>
+          </a:p>
+          <a:p>
+            <a:r>
+              <a:rPr lang="zh-CN" altLang="en-US" dirty="0"/>
+              <a:t>最下半径</a:t>
+            </a:r>
+            <a:r>
+              <a:rPr lang="en-US" altLang="zh-CN" dirty="0"/>
+              <a:t>3cm</a:t>
+            </a:r>
+            <a:endParaRPr lang="zh-CN" altLang="en-US" dirty="0"/>
+          </a:p>
+        </p:txBody>
+      </p:sp>
+    </p:spTree>
+    <p:extLst>
+      <p:ext uri="{BB962C8B-B14F-4D97-AF65-F5344CB8AC3E}">
+        <p14:creationId xmlns:p14="http://schemas.microsoft.com/office/powerpoint/2010/main" val="2375670756"/>
+      </p:ext>
+    </p:extLst>
+  </p:cSld>
+  <p:clrMapOvr>
+    <a:masterClrMapping/>
+  </p:clrMapOvr>
+</p:sld>
+</file>
+
+<file path=ppt/slides/slide3.xml><?xml version="1.0" encoding="utf-8"?>
+<p:sld xmlns:a="http://schemas.openxmlformats.org/drawingml/2006/main" xmlns:r="http://schemas.openxmlformats.org/officeDocument/2006/relationships" xmlns:p="http://schemas.openxmlformats.org/presentationml/2006/main">
+  <p:cSld>
+    <p:spTree>
+      <p:nvGrpSpPr>
+        <p:cNvPr id="1" name=""/>
+        <p:cNvGrpSpPr/>
+        <p:nvPr/>
+      </p:nvGrpSpPr>
+      <p:grpSpPr>
+        <a:xfrm>
+          <a:off x="0" y="0"/>
+          <a:ext cx="0" cy="0"/>
+          <a:chOff x="0" y="0"/>
+          <a:chExt cx="0" cy="0"/>
+        </a:xfrm>
+      </p:grpSpPr>
+      <p:grpSp>
+        <p:nvGrpSpPr>
+          <p:cNvPr id="6" name="组合 5">
+            <a:extLst>
+              <a:ext uri="{FF2B5EF4-FFF2-40B4-BE49-F238E27FC236}">
+                <a16:creationId xmlns:a16="http://schemas.microsoft.com/office/drawing/2014/main" id="{3E19F905-CC46-48A6-A413-A770E8007297}"/>
+              </a:ext>
+            </a:extLst>
+          </p:cNvPr>
+          <p:cNvGrpSpPr/>
+          <p:nvPr/>
+        </p:nvGrpSpPr>
+        <p:grpSpPr>
+          <a:xfrm>
+            <a:off x="5147442" y="529680"/>
+            <a:ext cx="5974080" cy="4572000"/>
+            <a:chOff x="5147442" y="529680"/>
+            <a:chExt cx="5974080" cy="4572000"/>
+          </a:xfrm>
+        </p:grpSpPr>
+        <p:sp>
+          <p:nvSpPr>
+            <p:cNvPr id="7" name="矩形 6">
+              <a:extLst>
+                <a:ext uri="{FF2B5EF4-FFF2-40B4-BE49-F238E27FC236}">
+                  <a16:creationId xmlns:a16="http://schemas.microsoft.com/office/drawing/2014/main" id="{61AD18E2-0F08-41F9-8739-EBB3CE6A12D2}"/>
+                </a:ext>
+              </a:extLst>
+            </p:cNvPr>
+            <p:cNvSpPr/>
+            <p:nvPr/>
+          </p:nvSpPr>
+          <p:spPr>
+            <a:xfrm>
+              <a:off x="5147442" y="529680"/>
+              <a:ext cx="5974080" cy="4572000"/>
+            </a:xfrm>
+            <a:prstGeom prst="rect">
+              <a:avLst/>
+            </a:prstGeom>
+            <a:solidFill>
+              <a:schemeClr val="bg1"/>
+            </a:solidFill>
+            <a:ln>
+              <a:solidFill>
+                <a:schemeClr val="tx1"/>
+              </a:solidFill>
+            </a:ln>
+          </p:spPr>
+          <p:style>
+            <a:lnRef idx="2">
+              <a:schemeClr val="accent1">
+                <a:shade val="50000"/>
+              </a:schemeClr>
+            </a:lnRef>
+            <a:fillRef idx="1">
+              <a:schemeClr val="accent1"/>
+            </a:fillRef>
+            <a:effectRef idx="0">
+              <a:schemeClr val="accent1"/>
+            </a:effectRef>
+            <a:fontRef idx="minor">
+              <a:schemeClr val="lt1"/>
+            </a:fontRef>
+          </p:style>
+          <p:txBody>
+            <a:bodyPr rtlCol="0" anchor="ctr"/>
+            <a:lstStyle/>
+            <a:p>
+              <a:pPr algn="ctr"/>
+              <a:endParaRPr lang="zh-CN" altLang="en-US"/>
+            </a:p>
+          </p:txBody>
+        </p:sp>
+        <p:sp>
+          <p:nvSpPr>
+            <p:cNvPr id="4" name="流程图: 接点 3">
+              <a:extLst>
+                <a:ext uri="{FF2B5EF4-FFF2-40B4-BE49-F238E27FC236}">
+                  <a16:creationId xmlns:a16="http://schemas.microsoft.com/office/drawing/2014/main" id="{3CC3B8DD-BF4F-46D2-B9D5-6E2F4C693C28}"/>
+                </a:ext>
+              </a:extLst>
+            </p:cNvPr>
+            <p:cNvSpPr/>
+            <p:nvPr/>
+          </p:nvSpPr>
+          <p:spPr>
+            <a:xfrm>
+              <a:off x="6334482" y="1015680"/>
+              <a:ext cx="3600000" cy="3600000"/>
+            </a:xfrm>
+            <a:prstGeom prst="flowChartConnector">
+              <a:avLst/>
+            </a:prstGeom>
+            <a:noFill/>
+            <a:ln w="38100">
+              <a:solidFill>
+                <a:schemeClr val="tx1"/>
+              </a:solidFill>
+            </a:ln>
+          </p:spPr>
+          <p:style>
+            <a:lnRef idx="2">
+              <a:schemeClr val="accent1">
+                <a:shade val="50000"/>
+              </a:schemeClr>
+            </a:lnRef>
+            <a:fillRef idx="1">
+              <a:schemeClr val="accent1"/>
+            </a:fillRef>
+            <a:effectRef idx="0">
+              <a:schemeClr val="accent1"/>
+            </a:effectRef>
+            <a:fontRef idx="minor">
+              <a:schemeClr val="lt1"/>
+            </a:fontRef>
+          </p:style>
+          <p:txBody>
+            <a:bodyPr rtlCol="0" anchor="ctr"/>
+            <a:lstStyle/>
+            <a:p>
+              <a:pPr algn="ctr"/>
+              <a:endParaRPr lang="zh-CN" altLang="en-US"/>
+            </a:p>
+          </p:txBody>
+        </p:sp>
+        <p:sp>
+          <p:nvSpPr>
+            <p:cNvPr id="9" name="流程图: 接点 8">
+              <a:extLst>
+                <a:ext uri="{FF2B5EF4-FFF2-40B4-BE49-F238E27FC236}">
+                  <a16:creationId xmlns:a16="http://schemas.microsoft.com/office/drawing/2014/main" id="{C01A70EB-F916-4695-88EC-7129624952EC}"/>
+                </a:ext>
+              </a:extLst>
+            </p:cNvPr>
+            <p:cNvSpPr/>
+            <p:nvPr/>
+          </p:nvSpPr>
+          <p:spPr>
+            <a:xfrm>
+              <a:off x="6694482" y="1375680"/>
+              <a:ext cx="2880000" cy="2880000"/>
+            </a:xfrm>
+            <a:prstGeom prst="flowChartConnector">
+              <a:avLst/>
+            </a:prstGeom>
+            <a:noFill/>
+            <a:ln w="38100">
+              <a:solidFill>
+                <a:schemeClr val="tx1"/>
+              </a:solidFill>
+            </a:ln>
+          </p:spPr>
+          <p:style>
+            <a:lnRef idx="2">
+              <a:schemeClr val="accent1">
+                <a:shade val="50000"/>
+              </a:schemeClr>
+            </a:lnRef>
+            <a:fillRef idx="1">
+              <a:schemeClr val="accent1"/>
+            </a:fillRef>
+            <a:effectRef idx="0">
+              <a:schemeClr val="accent1"/>
+            </a:effectRef>
+            <a:fontRef idx="minor">
+              <a:schemeClr val="lt1"/>
+            </a:fontRef>
+          </p:style>
+          <p:txBody>
+            <a:bodyPr rtlCol="0" anchor="ctr"/>
+            <a:lstStyle/>
+            <a:p>
+              <a:pPr algn="ctr"/>
+              <a:endParaRPr lang="zh-CN" altLang="en-US"/>
+            </a:p>
+          </p:txBody>
+        </p:sp>
+        <p:sp>
+          <p:nvSpPr>
+            <p:cNvPr id="10" name="流程图: 接点 9">
+              <a:extLst>
+                <a:ext uri="{FF2B5EF4-FFF2-40B4-BE49-F238E27FC236}">
+                  <a16:creationId xmlns:a16="http://schemas.microsoft.com/office/drawing/2014/main" id="{4210E950-9BB1-4978-A57E-C78DEF55612C}"/>
+                </a:ext>
+              </a:extLst>
+            </p:cNvPr>
+            <p:cNvSpPr/>
+            <p:nvPr/>
+          </p:nvSpPr>
+          <p:spPr>
+            <a:xfrm>
+              <a:off x="7054482" y="1735680"/>
+              <a:ext cx="2160000" cy="2160000"/>
+            </a:xfrm>
+            <a:prstGeom prst="flowChartConnector">
+              <a:avLst/>
+            </a:prstGeom>
+            <a:noFill/>
+            <a:ln w="38100">
+              <a:solidFill>
+                <a:schemeClr val="tx1"/>
+              </a:solidFill>
+            </a:ln>
+          </p:spPr>
+          <p:style>
+            <a:lnRef idx="2">
+              <a:schemeClr val="accent1">
+                <a:shade val="50000"/>
+              </a:schemeClr>
+            </a:lnRef>
+            <a:fillRef idx="1">
+              <a:schemeClr val="accent1"/>
+            </a:fillRef>
+            <a:effectRef idx="0">
+              <a:schemeClr val="accent1"/>
+            </a:effectRef>
+            <a:fontRef idx="minor">
+              <a:schemeClr val="lt1"/>
+            </a:fontRef>
+          </p:style>
+          <p:txBody>
+            <a:bodyPr rtlCol="0" anchor="ctr"/>
+            <a:lstStyle/>
+            <a:p>
+              <a:pPr algn="ctr"/>
+              <a:endParaRPr lang="zh-CN" altLang="en-US"/>
+            </a:p>
+          </p:txBody>
+        </p:sp>
+        <p:sp>
+          <p:nvSpPr>
+            <p:cNvPr id="11" name="流程图: 接点 10">
+              <a:extLst>
+                <a:ext uri="{FF2B5EF4-FFF2-40B4-BE49-F238E27FC236}">
+                  <a16:creationId xmlns:a16="http://schemas.microsoft.com/office/drawing/2014/main" id="{91DABCCD-C021-478B-84AE-1F3868C74A54}"/>
+                </a:ext>
+              </a:extLst>
+            </p:cNvPr>
+            <p:cNvSpPr/>
+            <p:nvPr/>
+          </p:nvSpPr>
+          <p:spPr>
+            <a:xfrm>
+              <a:off x="7414482" y="2095680"/>
+              <a:ext cx="1440000" cy="1440000"/>
+            </a:xfrm>
+            <a:prstGeom prst="flowChartConnector">
+              <a:avLst/>
+            </a:prstGeom>
+            <a:noFill/>
+            <a:ln w="38100">
+              <a:solidFill>
+                <a:schemeClr val="tx1"/>
+              </a:solidFill>
+            </a:ln>
+          </p:spPr>
+          <p:style>
+            <a:lnRef idx="2">
+              <a:schemeClr val="accent1">
+                <a:shade val="50000"/>
+              </a:schemeClr>
+            </a:lnRef>
+            <a:fillRef idx="1">
+              <a:schemeClr val="accent1"/>
+            </a:fillRef>
+            <a:effectRef idx="0">
+              <a:schemeClr val="accent1"/>
+            </a:effectRef>
+            <a:fontRef idx="minor">
+              <a:schemeClr val="lt1"/>
+            </a:fontRef>
+          </p:style>
+          <p:txBody>
+            <a:bodyPr rtlCol="0" anchor="ctr"/>
+            <a:lstStyle/>
+            <a:p>
+              <a:pPr algn="ctr"/>
+              <a:endParaRPr lang="zh-CN" altLang="en-US"/>
+            </a:p>
+          </p:txBody>
+        </p:sp>
+        <p:sp>
+          <p:nvSpPr>
+            <p:cNvPr id="13" name="流程图: 接点 12">
+              <a:extLst>
+                <a:ext uri="{FF2B5EF4-FFF2-40B4-BE49-F238E27FC236}">
+                  <a16:creationId xmlns:a16="http://schemas.microsoft.com/office/drawing/2014/main" id="{62AB4E7B-BED3-4F34-9095-EBFD76AFC7FE}"/>
+                </a:ext>
+              </a:extLst>
+            </p:cNvPr>
+            <p:cNvSpPr/>
+            <p:nvPr/>
+          </p:nvSpPr>
+          <p:spPr>
+            <a:xfrm>
+              <a:off x="8080482" y="2761680"/>
+              <a:ext cx="108000" cy="108000"/>
+            </a:xfrm>
+            <a:prstGeom prst="flowChartConnector">
+              <a:avLst/>
+            </a:prstGeom>
+            <a:noFill/>
+            <a:ln w="38100">
+              <a:solidFill>
+                <a:schemeClr val="tx1"/>
+              </a:solidFill>
+            </a:ln>
+          </p:spPr>
+          <p:style>
+            <a:lnRef idx="2">
+              <a:schemeClr val="accent1">
+                <a:shade val="50000"/>
+              </a:schemeClr>
+            </a:lnRef>
+            <a:fillRef idx="1">
+              <a:schemeClr val="accent1"/>
+            </a:fillRef>
+            <a:effectRef idx="0">
+              <a:schemeClr val="accent1"/>
+            </a:effectRef>
+            <a:fontRef idx="minor">
+              <a:schemeClr val="lt1"/>
+            </a:fontRef>
+          </p:style>
+          <p:txBody>
+            <a:bodyPr rtlCol="0" anchor="ctr"/>
+            <a:lstStyle/>
+            <a:p>
+              <a:pPr algn="ctr"/>
+              <a:endParaRPr lang="zh-CN" altLang="en-US"/>
+            </a:p>
+          </p:txBody>
+        </p:sp>
+      </p:grpSp>
+      <p:sp>
+        <p:nvSpPr>
+          <p:cNvPr id="15" name="文本框 14">
+            <a:extLst>
+              <a:ext uri="{FF2B5EF4-FFF2-40B4-BE49-F238E27FC236}">
+                <a16:creationId xmlns:a16="http://schemas.microsoft.com/office/drawing/2014/main" id="{E1986432-EBE2-4C7D-9BD0-946A1DE43E5D}"/>
+              </a:ext>
+            </a:extLst>
+          </p:cNvPr>
+          <p:cNvSpPr txBox="1"/>
+          <p:nvPr/>
+        </p:nvSpPr>
+        <p:spPr>
+          <a:xfrm>
+            <a:off x="1544320" y="1735680"/>
+            <a:ext cx="2523123" cy="646331"/>
+          </a:xfrm>
+          <a:prstGeom prst="rect">
+            <a:avLst/>
+          </a:prstGeom>
+          <a:noFill/>
+        </p:spPr>
+        <p:txBody>
+          <a:bodyPr wrap="square" rtlCol="0">
+            <a:spAutoFit/>
+          </a:bodyPr>
+          <a:lstStyle/>
+          <a:p>
+            <a:r>
+              <a:rPr lang="en-US" altLang="zh-CN" dirty="0"/>
+              <a:t>1.5mm</a:t>
+            </a:r>
+            <a:r>
+              <a:rPr lang="zh-CN" altLang="en-US" dirty="0"/>
+              <a:t>线宽 圆形</a:t>
+            </a:r>
+            <a:endParaRPr lang="en-US" altLang="zh-CN" dirty="0"/>
+          </a:p>
+          <a:p>
+            <a:r>
+              <a:rPr lang="zh-CN" altLang="en-US" dirty="0"/>
+              <a:t>最下半径</a:t>
+            </a:r>
+            <a:r>
+              <a:rPr lang="en-US" altLang="zh-CN" dirty="0"/>
+              <a:t>4.5cm</a:t>
+            </a:r>
+            <a:endParaRPr lang="zh-CN" altLang="en-US" dirty="0"/>
+          </a:p>
+        </p:txBody>
+      </p:sp>
+    </p:spTree>
+    <p:extLst>
+      <p:ext uri="{BB962C8B-B14F-4D97-AF65-F5344CB8AC3E}">
+        <p14:creationId xmlns:p14="http://schemas.microsoft.com/office/powerpoint/2010/main" val="1019235255"/>
+      </p:ext>
+    </p:extLst>
+  </p:cSld>
+  <p:clrMapOvr>
+    <a:masterClrMapping/>
+  </p:clrMapOvr>
+</p:sld>
+</file>
+
+<file path=ppt/slides/slide4.xml><?xml version="1.0" encoding="utf-8"?>
+<p:sld xmlns:a="http://schemas.openxmlformats.org/drawingml/2006/main" xmlns:r="http://schemas.openxmlformats.org/officeDocument/2006/relationships" xmlns:p="http://schemas.openxmlformats.org/presentationml/2006/main">
+  <p:cSld>
+    <p:spTree>
+      <p:nvGrpSpPr>
+        <p:cNvPr id="1" name=""/>
+        <p:cNvGrpSpPr/>
+        <p:nvPr/>
+      </p:nvGrpSpPr>
+      <p:grpSpPr>
+        <a:xfrm>
+          <a:off x="0" y="0"/>
+          <a:ext cx="0" cy="0"/>
+          <a:chOff x="0" y="0"/>
+          <a:chExt cx="0" cy="0"/>
+        </a:xfrm>
+      </p:grpSpPr>
+      <p:sp>
+        <p:nvSpPr>
+          <p:cNvPr id="15" name="文本框 14">
+            <a:extLst>
+              <a:ext uri="{FF2B5EF4-FFF2-40B4-BE49-F238E27FC236}">
+                <a16:creationId xmlns:a16="http://schemas.microsoft.com/office/drawing/2014/main" id="{E1986432-EBE2-4C7D-9BD0-946A1DE43E5D}"/>
+              </a:ext>
+            </a:extLst>
+          </p:cNvPr>
+          <p:cNvSpPr txBox="1"/>
+          <p:nvPr/>
+        </p:nvSpPr>
+        <p:spPr>
+          <a:xfrm>
+            <a:off x="1544320" y="1735680"/>
+            <a:ext cx="2523123" cy="646331"/>
+          </a:xfrm>
+          <a:prstGeom prst="rect">
+            <a:avLst/>
+          </a:prstGeom>
+          <a:noFill/>
+        </p:spPr>
+        <p:txBody>
+          <a:bodyPr wrap="square" rtlCol="0">
+            <a:spAutoFit/>
+          </a:bodyPr>
+          <a:lstStyle/>
+          <a:p>
+            <a:r>
+              <a:rPr lang="en-US" altLang="zh-CN" dirty="0"/>
+              <a:t>1.5mm</a:t>
+            </a:r>
+            <a:r>
+              <a:rPr lang="zh-CN" altLang="en-US" dirty="0"/>
+              <a:t>线宽 圆形</a:t>
+            </a:r>
+            <a:r>
+              <a:rPr lang="en-US" altLang="zh-CN" dirty="0"/>
+              <a:t>+</a:t>
+            </a:r>
+            <a:r>
+              <a:rPr lang="zh-CN" altLang="en-US" dirty="0"/>
+              <a:t>十字</a:t>
+            </a:r>
+            <a:endParaRPr lang="en-US" altLang="zh-CN" dirty="0"/>
+          </a:p>
+          <a:p>
+            <a:r>
+              <a:rPr lang="zh-CN" altLang="en-US" dirty="0"/>
+              <a:t>最下半径</a:t>
+            </a:r>
+            <a:r>
+              <a:rPr lang="en-US" altLang="zh-CN" dirty="0"/>
+              <a:t>4.5cm</a:t>
+            </a:r>
+            <a:endParaRPr lang="zh-CN" altLang="en-US" dirty="0"/>
+          </a:p>
+        </p:txBody>
+      </p:sp>
+      <p:grpSp>
+        <p:nvGrpSpPr>
+          <p:cNvPr id="5" name="组合 4">
+            <a:extLst>
+              <a:ext uri="{FF2B5EF4-FFF2-40B4-BE49-F238E27FC236}">
+                <a16:creationId xmlns:a16="http://schemas.microsoft.com/office/drawing/2014/main" id="{0ED0C842-9809-499D-9F40-D135859EFFF0}"/>
+              </a:ext>
+            </a:extLst>
+          </p:cNvPr>
+          <p:cNvGrpSpPr/>
+          <p:nvPr/>
+        </p:nvGrpSpPr>
+        <p:grpSpPr>
+          <a:xfrm>
+            <a:off x="5147442" y="529680"/>
+            <a:ext cx="5974080" cy="4572000"/>
+            <a:chOff x="5147442" y="529680"/>
+            <a:chExt cx="5974080" cy="4572000"/>
+          </a:xfrm>
+        </p:grpSpPr>
+        <p:sp>
+          <p:nvSpPr>
+            <p:cNvPr id="7" name="矩形 6">
+              <a:extLst>
+                <a:ext uri="{FF2B5EF4-FFF2-40B4-BE49-F238E27FC236}">
+                  <a16:creationId xmlns:a16="http://schemas.microsoft.com/office/drawing/2014/main" id="{61AD18E2-0F08-41F9-8739-EBB3CE6A12D2}"/>
+                </a:ext>
+              </a:extLst>
+            </p:cNvPr>
+            <p:cNvSpPr/>
+            <p:nvPr/>
+          </p:nvSpPr>
+          <p:spPr>
+            <a:xfrm>
+              <a:off x="5147442" y="529680"/>
+              <a:ext cx="5974080" cy="4572000"/>
+            </a:xfrm>
+            <a:prstGeom prst="rect">
+              <a:avLst/>
+            </a:prstGeom>
+            <a:solidFill>
+              <a:schemeClr val="bg1"/>
+            </a:solidFill>
+            <a:ln>
+              <a:solidFill>
+                <a:schemeClr val="tx1"/>
+              </a:solidFill>
+            </a:ln>
+          </p:spPr>
+          <p:style>
+            <a:lnRef idx="2">
+              <a:schemeClr val="accent1">
+                <a:shade val="50000"/>
+              </a:schemeClr>
+            </a:lnRef>
+            <a:fillRef idx="1">
+              <a:schemeClr val="accent1"/>
+            </a:fillRef>
+            <a:effectRef idx="0">
+              <a:schemeClr val="accent1"/>
+            </a:effectRef>
+            <a:fontRef idx="minor">
+              <a:schemeClr val="lt1"/>
+            </a:fontRef>
+          </p:style>
+          <p:txBody>
+            <a:bodyPr rtlCol="0" anchor="ctr"/>
+            <a:lstStyle/>
+            <a:p>
+              <a:pPr algn="ctr"/>
+              <a:endParaRPr lang="zh-CN" altLang="en-US"/>
+            </a:p>
+          </p:txBody>
+        </p:sp>
+        <p:sp>
+          <p:nvSpPr>
+            <p:cNvPr id="4" name="流程图: 接点 3">
+              <a:extLst>
+                <a:ext uri="{FF2B5EF4-FFF2-40B4-BE49-F238E27FC236}">
+                  <a16:creationId xmlns:a16="http://schemas.microsoft.com/office/drawing/2014/main" id="{3CC3B8DD-BF4F-46D2-B9D5-6E2F4C693C28}"/>
+                </a:ext>
+              </a:extLst>
+            </p:cNvPr>
+            <p:cNvSpPr/>
+            <p:nvPr/>
+          </p:nvSpPr>
+          <p:spPr>
+            <a:xfrm>
+              <a:off x="6334482" y="1015680"/>
+              <a:ext cx="3600000" cy="3600000"/>
+            </a:xfrm>
+            <a:prstGeom prst="flowChartConnector">
+              <a:avLst/>
+            </a:prstGeom>
+            <a:noFill/>
+            <a:ln w="38100">
+              <a:solidFill>
+                <a:schemeClr val="tx1"/>
+              </a:solidFill>
+            </a:ln>
+          </p:spPr>
+          <p:style>
+            <a:lnRef idx="2">
+              <a:schemeClr val="accent1">
+                <a:shade val="50000"/>
+              </a:schemeClr>
+            </a:lnRef>
+            <a:fillRef idx="1">
+              <a:schemeClr val="accent1"/>
+            </a:fillRef>
+            <a:effectRef idx="0">
+              <a:schemeClr val="accent1"/>
+            </a:effectRef>
+            <a:fontRef idx="minor">
+              <a:schemeClr val="lt1"/>
+            </a:fontRef>
+          </p:style>
+          <p:txBody>
+            <a:bodyPr rtlCol="0" anchor="ctr"/>
+            <a:lstStyle/>
+            <a:p>
+              <a:pPr algn="ctr"/>
+              <a:endParaRPr lang="zh-CN" altLang="en-US"/>
+            </a:p>
+          </p:txBody>
+        </p:sp>
+        <p:sp>
+          <p:nvSpPr>
+            <p:cNvPr id="9" name="流程图: 接点 8">
+              <a:extLst>
+                <a:ext uri="{FF2B5EF4-FFF2-40B4-BE49-F238E27FC236}">
+                  <a16:creationId xmlns:a16="http://schemas.microsoft.com/office/drawing/2014/main" id="{C01A70EB-F916-4695-88EC-7129624952EC}"/>
+                </a:ext>
+              </a:extLst>
+            </p:cNvPr>
+            <p:cNvSpPr/>
+            <p:nvPr/>
+          </p:nvSpPr>
+          <p:spPr>
+            <a:xfrm>
+              <a:off x="6694482" y="1375680"/>
+              <a:ext cx="2880000" cy="2880000"/>
+            </a:xfrm>
+            <a:prstGeom prst="flowChartConnector">
+              <a:avLst/>
+            </a:prstGeom>
+            <a:noFill/>
+            <a:ln w="38100">
+              <a:solidFill>
+                <a:schemeClr val="tx1"/>
+              </a:solidFill>
+            </a:ln>
+          </p:spPr>
+          <p:style>
+            <a:lnRef idx="2">
+              <a:schemeClr val="accent1">
+                <a:shade val="50000"/>
+              </a:schemeClr>
+            </a:lnRef>
+            <a:fillRef idx="1">
+              <a:schemeClr val="accent1"/>
+            </a:fillRef>
+            <a:effectRef idx="0">
+              <a:schemeClr val="accent1"/>
+            </a:effectRef>
+            <a:fontRef idx="minor">
+              <a:schemeClr val="lt1"/>
+            </a:fontRef>
+          </p:style>
+          <p:txBody>
+            <a:bodyPr rtlCol="0" anchor="ctr"/>
+            <a:lstStyle/>
+            <a:p>
+              <a:pPr algn="ctr"/>
+              <a:endParaRPr lang="zh-CN" altLang="en-US"/>
+            </a:p>
+          </p:txBody>
+        </p:sp>
+        <p:sp>
+          <p:nvSpPr>
+            <p:cNvPr id="10" name="流程图: 接点 9">
+              <a:extLst>
+                <a:ext uri="{FF2B5EF4-FFF2-40B4-BE49-F238E27FC236}">
+                  <a16:creationId xmlns:a16="http://schemas.microsoft.com/office/drawing/2014/main" id="{4210E950-9BB1-4978-A57E-C78DEF55612C}"/>
+                </a:ext>
+              </a:extLst>
+            </p:cNvPr>
+            <p:cNvSpPr/>
+            <p:nvPr/>
+          </p:nvSpPr>
+          <p:spPr>
+            <a:xfrm>
+              <a:off x="7054482" y="1735680"/>
+              <a:ext cx="2160000" cy="2160000"/>
+            </a:xfrm>
+            <a:prstGeom prst="flowChartConnector">
+              <a:avLst/>
+            </a:prstGeom>
+            <a:noFill/>
+            <a:ln w="38100">
+              <a:solidFill>
+                <a:schemeClr val="tx1"/>
+              </a:solidFill>
+            </a:ln>
+          </p:spPr>
+          <p:style>
+            <a:lnRef idx="2">
+              <a:schemeClr val="accent1">
+                <a:shade val="50000"/>
+              </a:schemeClr>
+            </a:lnRef>
+            <a:fillRef idx="1">
+              <a:schemeClr val="accent1"/>
+            </a:fillRef>
+            <a:effectRef idx="0">
+              <a:schemeClr val="accent1"/>
+            </a:effectRef>
+            <a:fontRef idx="minor">
+              <a:schemeClr val="lt1"/>
+            </a:fontRef>
+          </p:style>
+          <p:txBody>
+            <a:bodyPr rtlCol="0" anchor="ctr"/>
+            <a:lstStyle/>
+            <a:p>
+              <a:pPr algn="ctr"/>
+              <a:endParaRPr lang="zh-CN" altLang="en-US"/>
+            </a:p>
+          </p:txBody>
+        </p:sp>
+        <p:sp>
+          <p:nvSpPr>
+            <p:cNvPr id="11" name="流程图: 接点 10">
+              <a:extLst>
+                <a:ext uri="{FF2B5EF4-FFF2-40B4-BE49-F238E27FC236}">
+                  <a16:creationId xmlns:a16="http://schemas.microsoft.com/office/drawing/2014/main" id="{91DABCCD-C021-478B-84AE-1F3868C74A54}"/>
+                </a:ext>
+              </a:extLst>
+            </p:cNvPr>
+            <p:cNvSpPr/>
+            <p:nvPr/>
+          </p:nvSpPr>
+          <p:spPr>
+            <a:xfrm>
+              <a:off x="7414482" y="2095680"/>
+              <a:ext cx="1440000" cy="1440000"/>
+            </a:xfrm>
+            <a:prstGeom prst="flowChartConnector">
+              <a:avLst/>
+            </a:prstGeom>
+            <a:noFill/>
+            <a:ln w="38100">
+              <a:solidFill>
+                <a:schemeClr val="tx1"/>
+              </a:solidFill>
+            </a:ln>
+          </p:spPr>
+          <p:style>
+            <a:lnRef idx="2">
+              <a:schemeClr val="accent1">
+                <a:shade val="50000"/>
+              </a:schemeClr>
+            </a:lnRef>
+            <a:fillRef idx="1">
+              <a:schemeClr val="accent1"/>
+            </a:fillRef>
+            <a:effectRef idx="0">
+              <a:schemeClr val="accent1"/>
+            </a:effectRef>
+            <a:fontRef idx="minor">
+              <a:schemeClr val="lt1"/>
+            </a:fontRef>
+          </p:style>
+          <p:txBody>
+            <a:bodyPr rtlCol="0" anchor="ctr"/>
+            <a:lstStyle/>
+            <a:p>
+              <a:pPr algn="ctr"/>
+              <a:endParaRPr lang="zh-CN" altLang="en-US"/>
+            </a:p>
+          </p:txBody>
+        </p:sp>
+        <p:sp>
+          <p:nvSpPr>
+            <p:cNvPr id="13" name="流程图: 接点 12">
+              <a:extLst>
+                <a:ext uri="{FF2B5EF4-FFF2-40B4-BE49-F238E27FC236}">
+                  <a16:creationId xmlns:a16="http://schemas.microsoft.com/office/drawing/2014/main" id="{62AB4E7B-BED3-4F34-9095-EBFD76AFC7FE}"/>
+                </a:ext>
+              </a:extLst>
+            </p:cNvPr>
+            <p:cNvSpPr/>
+            <p:nvPr/>
+          </p:nvSpPr>
+          <p:spPr>
+            <a:xfrm>
+              <a:off x="8080482" y="2761680"/>
+              <a:ext cx="108000" cy="108000"/>
+            </a:xfrm>
+            <a:prstGeom prst="flowChartConnector">
+              <a:avLst/>
+            </a:prstGeom>
+            <a:noFill/>
+            <a:ln w="38100">
+              <a:solidFill>
+                <a:schemeClr val="tx1"/>
+              </a:solidFill>
+            </a:ln>
+          </p:spPr>
+          <p:style>
+            <a:lnRef idx="2">
+              <a:schemeClr val="accent1">
+                <a:shade val="50000"/>
+              </a:schemeClr>
+            </a:lnRef>
+            <a:fillRef idx="1">
+              <a:schemeClr val="accent1"/>
+            </a:fillRef>
+            <a:effectRef idx="0">
+              <a:schemeClr val="accent1"/>
+            </a:effectRef>
+            <a:fontRef idx="minor">
+              <a:schemeClr val="lt1"/>
+            </a:fontRef>
+          </p:style>
+          <p:txBody>
+            <a:bodyPr rtlCol="0" anchor="ctr"/>
+            <a:lstStyle/>
+            <a:p>
+              <a:pPr algn="ctr"/>
+              <a:endParaRPr lang="zh-CN" altLang="en-US"/>
+            </a:p>
+          </p:txBody>
+        </p:sp>
+        <p:cxnSp>
+          <p:nvCxnSpPr>
+            <p:cNvPr id="12" name="直接连接符 11">
+              <a:extLst>
+                <a:ext uri="{FF2B5EF4-FFF2-40B4-BE49-F238E27FC236}">
+                  <a16:creationId xmlns:a16="http://schemas.microsoft.com/office/drawing/2014/main" id="{B6DD1094-43B3-4FD8-A5F1-2414EFE75CFF}"/>
+                </a:ext>
+              </a:extLst>
+            </p:cNvPr>
+            <p:cNvCxnSpPr>
+              <a:cxnSpLocks/>
+            </p:cNvCxnSpPr>
+            <p:nvPr/>
+          </p:nvCxnSpPr>
+          <p:spPr>
+            <a:xfrm>
+              <a:off x="8134482" y="1015680"/>
+              <a:ext cx="0" cy="3600000"/>
+            </a:xfrm>
+            <a:prstGeom prst="line">
+              <a:avLst/>
+            </a:prstGeom>
+            <a:ln w="38100"/>
+          </p:spPr>
+          <p:style>
+            <a:lnRef idx="1">
+              <a:schemeClr val="dk1"/>
+            </a:lnRef>
+            <a:fillRef idx="0">
+              <a:schemeClr val="dk1"/>
+            </a:fillRef>
+            <a:effectRef idx="0">
+              <a:schemeClr val="dk1"/>
+            </a:effectRef>
+            <a:fontRef idx="minor">
+              <a:schemeClr val="tx1"/>
+            </a:fontRef>
+          </p:style>
+        </p:cxnSp>
+        <p:cxnSp>
+          <p:nvCxnSpPr>
+            <p:cNvPr id="14" name="直接连接符 13">
+              <a:extLst>
+                <a:ext uri="{FF2B5EF4-FFF2-40B4-BE49-F238E27FC236}">
+                  <a16:creationId xmlns:a16="http://schemas.microsoft.com/office/drawing/2014/main" id="{98CF8F7B-CBD5-4FF7-950C-D5C089B860AB}"/>
+                </a:ext>
+              </a:extLst>
+            </p:cNvPr>
+            <p:cNvCxnSpPr>
+              <a:cxnSpLocks/>
+              <a:stCxn id="4" idx="6"/>
+              <a:endCxn id="4" idx="2"/>
+            </p:cNvCxnSpPr>
+            <p:nvPr/>
+          </p:nvCxnSpPr>
+          <p:spPr>
+            <a:xfrm flipH="1">
+              <a:off x="6334482" y="2815680"/>
+              <a:ext cx="3600000" cy="0"/>
+            </a:xfrm>
+            <a:prstGeom prst="line">
+              <a:avLst/>
+            </a:prstGeom>
+            <a:ln w="38100"/>
+          </p:spPr>
+          <p:style>
+            <a:lnRef idx="1">
+              <a:schemeClr val="dk1"/>
+            </a:lnRef>
+            <a:fillRef idx="0">
+              <a:schemeClr val="dk1"/>
+            </a:fillRef>
+            <a:effectRef idx="0">
+              <a:schemeClr val="dk1"/>
+            </a:effectRef>
+            <a:fontRef idx="minor">
+              <a:schemeClr val="tx1"/>
+            </a:fontRef>
+          </p:style>
+        </p:cxnSp>
+      </p:grpSp>
+    </p:spTree>
+    <p:extLst>
+      <p:ext uri="{BB962C8B-B14F-4D97-AF65-F5344CB8AC3E}">
+        <p14:creationId xmlns:p14="http://schemas.microsoft.com/office/powerpoint/2010/main" val="664576329"/>
+      </p:ext>
+    </p:extLst>
+  </p:cSld>
+  <p:clrMapOvr>
+    <a:masterClrMapping/>
+  </p:clrMapOvr>
+</p:sld>
+</file>
+
+<file path=ppt/slides/slide5.xml><?xml version="1.0" encoding="utf-8"?>
+<p:sld xmlns:a="http://schemas.openxmlformats.org/drawingml/2006/main" xmlns:r="http://schemas.openxmlformats.org/officeDocument/2006/relationships" xmlns:p="http://schemas.openxmlformats.org/presentationml/2006/main">
+  <p:cSld>
+    <p:spTree>
+      <p:nvGrpSpPr>
+        <p:cNvPr id="1" name=""/>
+        <p:cNvGrpSpPr/>
+        <p:nvPr/>
+      </p:nvGrpSpPr>
+      <p:grpSpPr>
+        <a:xfrm>
+          <a:off x="0" y="0"/>
+          <a:ext cx="0" cy="0"/>
+          <a:chOff x="0" y="0"/>
+          <a:chExt cx="0" cy="0"/>
+        </a:xfrm>
+      </p:grpSpPr>
+      <p:grpSp>
+        <p:nvGrpSpPr>
+          <p:cNvPr id="2" name="组合 1">
+            <a:extLst>
+              <a:ext uri="{FF2B5EF4-FFF2-40B4-BE49-F238E27FC236}">
+                <a16:creationId xmlns:a16="http://schemas.microsoft.com/office/drawing/2014/main" id="{60D31817-BB80-45FB-BED9-596453880AB1}"/>
+              </a:ext>
+            </a:extLst>
+          </p:cNvPr>
+          <p:cNvGrpSpPr/>
+          <p:nvPr/>
+        </p:nvGrpSpPr>
+        <p:grpSpPr>
+          <a:xfrm>
+            <a:off x="5147442" y="529680"/>
+            <a:ext cx="5974080" cy="4572000"/>
+            <a:chOff x="5147442" y="529680"/>
+            <a:chExt cx="5974080" cy="4572000"/>
+          </a:xfrm>
+        </p:grpSpPr>
+        <p:sp>
+          <p:nvSpPr>
+            <p:cNvPr id="7" name="矩形 6">
+              <a:extLst>
+                <a:ext uri="{FF2B5EF4-FFF2-40B4-BE49-F238E27FC236}">
+                  <a16:creationId xmlns:a16="http://schemas.microsoft.com/office/drawing/2014/main" id="{61AD18E2-0F08-41F9-8739-EBB3CE6A12D2}"/>
+                </a:ext>
+              </a:extLst>
+            </p:cNvPr>
+            <p:cNvSpPr/>
+            <p:nvPr/>
+          </p:nvSpPr>
+          <p:spPr>
+            <a:xfrm>
+              <a:off x="5147442" y="529680"/>
+              <a:ext cx="5974080" cy="4572000"/>
+            </a:xfrm>
+            <a:prstGeom prst="rect">
+              <a:avLst/>
+            </a:prstGeom>
+            <a:solidFill>
+              <a:schemeClr val="bg1"/>
+            </a:solidFill>
+            <a:ln>
+              <a:solidFill>
+                <a:schemeClr val="tx1"/>
+              </a:solidFill>
+            </a:ln>
+          </p:spPr>
+          <p:style>
+            <a:lnRef idx="2">
+              <a:schemeClr val="accent1">
+                <a:shade val="50000"/>
+              </a:schemeClr>
+            </a:lnRef>
+            <a:fillRef idx="1">
+              <a:schemeClr val="accent1"/>
+            </a:fillRef>
+            <a:effectRef idx="0">
+              <a:schemeClr val="accent1"/>
+            </a:effectRef>
+            <a:fontRef idx="minor">
+              <a:schemeClr val="lt1"/>
+            </a:fontRef>
+          </p:style>
+          <p:txBody>
+            <a:bodyPr rtlCol="0" anchor="ctr"/>
+            <a:lstStyle/>
+            <a:p>
+              <a:pPr algn="ctr"/>
+              <a:endParaRPr lang="zh-CN" altLang="en-US"/>
+            </a:p>
+          </p:txBody>
+        </p:sp>
+        <p:sp>
+          <p:nvSpPr>
+            <p:cNvPr id="4" name="流程图: 接点 3">
+              <a:extLst>
+                <a:ext uri="{FF2B5EF4-FFF2-40B4-BE49-F238E27FC236}">
+                  <a16:creationId xmlns:a16="http://schemas.microsoft.com/office/drawing/2014/main" id="{3CC3B8DD-BF4F-46D2-B9D5-6E2F4C693C28}"/>
+                </a:ext>
+              </a:extLst>
+            </p:cNvPr>
+            <p:cNvSpPr/>
+            <p:nvPr/>
+          </p:nvSpPr>
+          <p:spPr>
+            <a:xfrm>
+              <a:off x="6334482" y="1015680"/>
+              <a:ext cx="3600000" cy="3600000"/>
+            </a:xfrm>
+            <a:prstGeom prst="flowChartConnector">
+              <a:avLst/>
+            </a:prstGeom>
+            <a:noFill/>
+            <a:ln w="25400">
+              <a:solidFill>
+                <a:schemeClr val="tx1"/>
+              </a:solidFill>
+            </a:ln>
+          </p:spPr>
+          <p:style>
+            <a:lnRef idx="2">
+              <a:schemeClr val="accent1">
+                <a:shade val="50000"/>
+              </a:schemeClr>
+            </a:lnRef>
+            <a:fillRef idx="1">
+              <a:schemeClr val="accent1"/>
+            </a:fillRef>
+            <a:effectRef idx="0">
+              <a:schemeClr val="accent1"/>
+            </a:effectRef>
+            <a:fontRef idx="minor">
+              <a:schemeClr val="lt1"/>
+            </a:fontRef>
+          </p:style>
+          <p:txBody>
+            <a:bodyPr rtlCol="0" anchor="ctr"/>
+            <a:lstStyle/>
+            <a:p>
+              <a:pPr algn="ctr"/>
+              <a:endParaRPr lang="zh-CN" altLang="en-US"/>
+            </a:p>
+          </p:txBody>
+        </p:sp>
+        <p:sp>
+          <p:nvSpPr>
+            <p:cNvPr id="9" name="流程图: 接点 8">
+              <a:extLst>
+                <a:ext uri="{FF2B5EF4-FFF2-40B4-BE49-F238E27FC236}">
+                  <a16:creationId xmlns:a16="http://schemas.microsoft.com/office/drawing/2014/main" id="{C01A70EB-F916-4695-88EC-7129624952EC}"/>
+                </a:ext>
+              </a:extLst>
+            </p:cNvPr>
+            <p:cNvSpPr/>
+            <p:nvPr/>
+          </p:nvSpPr>
+          <p:spPr>
+            <a:xfrm>
+              <a:off x="6694482" y="1375680"/>
+              <a:ext cx="2880000" cy="2880000"/>
+            </a:xfrm>
+            <a:prstGeom prst="flowChartConnector">
+              <a:avLst/>
+            </a:prstGeom>
+            <a:noFill/>
+            <a:ln w="25400">
+              <a:solidFill>
+                <a:schemeClr val="tx1"/>
+              </a:solidFill>
+            </a:ln>
+          </p:spPr>
+          <p:style>
+            <a:lnRef idx="2">
+              <a:schemeClr val="accent1">
+                <a:shade val="50000"/>
+              </a:schemeClr>
+            </a:lnRef>
+            <a:fillRef idx="1">
+              <a:schemeClr val="accent1"/>
+            </a:fillRef>
+            <a:effectRef idx="0">
+              <a:schemeClr val="accent1"/>
+            </a:effectRef>
+            <a:fontRef idx="minor">
+              <a:schemeClr val="lt1"/>
+            </a:fontRef>
+          </p:style>
+          <p:txBody>
+            <a:bodyPr rtlCol="0" anchor="ctr"/>
+            <a:lstStyle/>
+            <a:p>
+              <a:pPr algn="ctr"/>
+              <a:endParaRPr lang="zh-CN" altLang="en-US"/>
+            </a:p>
+          </p:txBody>
+        </p:sp>
+        <p:sp>
+          <p:nvSpPr>
+            <p:cNvPr id="10" name="流程图: 接点 9">
+              <a:extLst>
+                <a:ext uri="{FF2B5EF4-FFF2-40B4-BE49-F238E27FC236}">
+                  <a16:creationId xmlns:a16="http://schemas.microsoft.com/office/drawing/2014/main" id="{4210E950-9BB1-4978-A57E-C78DEF55612C}"/>
+                </a:ext>
+              </a:extLst>
+            </p:cNvPr>
+            <p:cNvSpPr/>
+            <p:nvPr/>
+          </p:nvSpPr>
+          <p:spPr>
+            <a:xfrm>
+              <a:off x="7054482" y="1735680"/>
+              <a:ext cx="2160000" cy="2160000"/>
+            </a:xfrm>
+            <a:prstGeom prst="flowChartConnector">
+              <a:avLst/>
+            </a:prstGeom>
+            <a:noFill/>
+            <a:ln w="25400">
+              <a:solidFill>
+                <a:schemeClr val="tx1"/>
+              </a:solidFill>
+            </a:ln>
+          </p:spPr>
+          <p:style>
+            <a:lnRef idx="2">
+              <a:schemeClr val="accent1">
+                <a:shade val="50000"/>
+              </a:schemeClr>
+            </a:lnRef>
+            <a:fillRef idx="1">
+              <a:schemeClr val="accent1"/>
+            </a:fillRef>
+            <a:effectRef idx="0">
+              <a:schemeClr val="accent1"/>
+            </a:effectRef>
+            <a:fontRef idx="minor">
+              <a:schemeClr val="lt1"/>
+            </a:fontRef>
+          </p:style>
+          <p:txBody>
+            <a:bodyPr rtlCol="0" anchor="ctr"/>
+            <a:lstStyle/>
+            <a:p>
+              <a:pPr algn="ctr"/>
+              <a:endParaRPr lang="zh-CN" altLang="en-US"/>
+            </a:p>
+          </p:txBody>
+        </p:sp>
+        <p:sp>
+          <p:nvSpPr>
+            <p:cNvPr id="11" name="流程图: 接点 10">
+              <a:extLst>
+                <a:ext uri="{FF2B5EF4-FFF2-40B4-BE49-F238E27FC236}">
+                  <a16:creationId xmlns:a16="http://schemas.microsoft.com/office/drawing/2014/main" id="{91DABCCD-C021-478B-84AE-1F3868C74A54}"/>
+                </a:ext>
+              </a:extLst>
+            </p:cNvPr>
+            <p:cNvSpPr/>
+            <p:nvPr/>
+          </p:nvSpPr>
+          <p:spPr>
+            <a:xfrm>
+              <a:off x="7414482" y="2095680"/>
+              <a:ext cx="1440000" cy="1440000"/>
+            </a:xfrm>
+            <a:prstGeom prst="flowChartConnector">
+              <a:avLst/>
+            </a:prstGeom>
+            <a:noFill/>
+            <a:ln w="25400">
+              <a:solidFill>
+                <a:schemeClr val="tx1"/>
+              </a:solidFill>
+            </a:ln>
+          </p:spPr>
+          <p:style>
+            <a:lnRef idx="2">
+              <a:schemeClr val="accent1">
+                <a:shade val="50000"/>
+              </a:schemeClr>
+            </a:lnRef>
+            <a:fillRef idx="1">
+              <a:schemeClr val="accent1"/>
+            </a:fillRef>
+            <a:effectRef idx="0">
+              <a:schemeClr val="accent1"/>
+            </a:effectRef>
+            <a:fontRef idx="minor">
+              <a:schemeClr val="lt1"/>
+            </a:fontRef>
+          </p:style>
+          <p:txBody>
+            <a:bodyPr rtlCol="0" anchor="ctr"/>
+            <a:lstStyle/>
+            <a:p>
+              <a:pPr algn="ctr"/>
+              <a:endParaRPr lang="zh-CN" altLang="en-US"/>
+            </a:p>
+          </p:txBody>
+        </p:sp>
+        <p:sp>
+          <p:nvSpPr>
+            <p:cNvPr id="13" name="流程图: 接点 12">
+              <a:extLst>
+                <a:ext uri="{FF2B5EF4-FFF2-40B4-BE49-F238E27FC236}">
+                  <a16:creationId xmlns:a16="http://schemas.microsoft.com/office/drawing/2014/main" id="{62AB4E7B-BED3-4F34-9095-EBFD76AFC7FE}"/>
+                </a:ext>
+              </a:extLst>
+            </p:cNvPr>
+            <p:cNvSpPr/>
+            <p:nvPr/>
+          </p:nvSpPr>
+          <p:spPr>
+            <a:xfrm>
+              <a:off x="8080482" y="2761680"/>
+              <a:ext cx="108000" cy="108000"/>
+            </a:xfrm>
+            <a:prstGeom prst="flowChartConnector">
+              <a:avLst/>
+            </a:prstGeom>
+            <a:noFill/>
+            <a:ln w="25400">
+              <a:solidFill>
+                <a:schemeClr val="tx1"/>
+              </a:solidFill>
+            </a:ln>
+          </p:spPr>
+          <p:style>
+            <a:lnRef idx="2">
+              <a:schemeClr val="accent1">
+                <a:shade val="50000"/>
+              </a:schemeClr>
+            </a:lnRef>
+            <a:fillRef idx="1">
+              <a:schemeClr val="accent1"/>
+            </a:fillRef>
+            <a:effectRef idx="0">
+              <a:schemeClr val="accent1"/>
+            </a:effectRef>
+            <a:fontRef idx="minor">
+              <a:schemeClr val="lt1"/>
+            </a:fontRef>
+          </p:style>
+          <p:txBody>
+            <a:bodyPr rtlCol="0" anchor="ctr"/>
+            <a:lstStyle/>
+            <a:p>
+              <a:pPr algn="ctr"/>
+              <a:endParaRPr lang="zh-CN" altLang="en-US"/>
+            </a:p>
+          </p:txBody>
+        </p:sp>
+      </p:grpSp>
+      <p:sp>
+        <p:nvSpPr>
+          <p:cNvPr id="15" name="文本框 14">
+            <a:extLst>
+              <a:ext uri="{FF2B5EF4-FFF2-40B4-BE49-F238E27FC236}">
+                <a16:creationId xmlns:a16="http://schemas.microsoft.com/office/drawing/2014/main" id="{E1986432-EBE2-4C7D-9BD0-946A1DE43E5D}"/>
+              </a:ext>
+            </a:extLst>
+          </p:cNvPr>
+          <p:cNvSpPr txBox="1"/>
+          <p:nvPr/>
+        </p:nvSpPr>
+        <p:spPr>
+          <a:xfrm>
+            <a:off x="1544320" y="1735680"/>
+            <a:ext cx="2523123" cy="646331"/>
+          </a:xfrm>
+          <a:prstGeom prst="rect">
+            <a:avLst/>
+          </a:prstGeom>
+          <a:noFill/>
+        </p:spPr>
+        <p:txBody>
+          <a:bodyPr wrap="square" rtlCol="0">
+            <a:spAutoFit/>
+          </a:bodyPr>
+          <a:lstStyle/>
+          <a:p>
+            <a:r>
+              <a:rPr lang="en-US" altLang="zh-CN" dirty="0"/>
+              <a:t>1mm</a:t>
+            </a:r>
+            <a:r>
+              <a:rPr lang="zh-CN" altLang="en-US" dirty="0"/>
+              <a:t>线宽 圆形</a:t>
+            </a:r>
+            <a:endParaRPr lang="en-US" altLang="zh-CN" dirty="0"/>
+          </a:p>
+          <a:p>
+            <a:r>
+              <a:rPr lang="zh-CN" altLang="en-US" dirty="0"/>
+              <a:t>最下半径</a:t>
+            </a:r>
+            <a:r>
+              <a:rPr lang="en-US" altLang="zh-CN" dirty="0"/>
+              <a:t>4.5cm</a:t>
+            </a:r>
+            <a:endParaRPr lang="zh-CN" altLang="en-US" dirty="0"/>
+          </a:p>
+        </p:txBody>
+      </p:sp>
+    </p:spTree>
+    <p:extLst>
+      <p:ext uri="{BB962C8B-B14F-4D97-AF65-F5344CB8AC3E}">
+        <p14:creationId xmlns:p14="http://schemas.microsoft.com/office/powerpoint/2010/main" val="4264103925"/>
+      </p:ext>
+    </p:extLst>
+  </p:cSld>
+  <p:clrMapOvr>
+    <a:masterClrMapping/>
+  </p:clrMapOvr>
+</p:sld>
+</file>
+
+<file path=ppt/slides/slide6.xml><?xml version="1.0" encoding="utf-8"?>
+<p:sld xmlns:a="http://schemas.openxmlformats.org/drawingml/2006/main" xmlns:r="http://schemas.openxmlformats.org/officeDocument/2006/relationships" xmlns:p="http://schemas.openxmlformats.org/presentationml/2006/main">
+  <p:cSld>
+    <p:spTree>
+      <p:nvGrpSpPr>
+        <p:cNvPr id="1" name=""/>
+        <p:cNvGrpSpPr/>
+        <p:nvPr/>
+      </p:nvGrpSpPr>
+      <p:grpSpPr>
+        <a:xfrm>
+          <a:off x="0" y="0"/>
+          <a:ext cx="0" cy="0"/>
+          <a:chOff x="0" y="0"/>
+          <a:chExt cx="0" cy="0"/>
+        </a:xfrm>
+      </p:grpSpPr>
+      <p:sp>
+        <p:nvSpPr>
+          <p:cNvPr id="15" name="文本框 14">
+            <a:extLst>
+              <a:ext uri="{FF2B5EF4-FFF2-40B4-BE49-F238E27FC236}">
+                <a16:creationId xmlns:a16="http://schemas.microsoft.com/office/drawing/2014/main" id="{E1986432-EBE2-4C7D-9BD0-946A1DE43E5D}"/>
+              </a:ext>
+            </a:extLst>
+          </p:cNvPr>
+          <p:cNvSpPr txBox="1"/>
+          <p:nvPr/>
+        </p:nvSpPr>
+        <p:spPr>
+          <a:xfrm>
+            <a:off x="1544320" y="1735680"/>
+            <a:ext cx="2523123" cy="646331"/>
+          </a:xfrm>
+          <a:prstGeom prst="rect">
+            <a:avLst/>
+          </a:prstGeom>
+          <a:noFill/>
+        </p:spPr>
+        <p:txBody>
+          <a:bodyPr wrap="square" rtlCol="0">
+            <a:spAutoFit/>
+          </a:bodyPr>
+          <a:lstStyle/>
+          <a:p>
+            <a:r>
+              <a:rPr lang="en-US" altLang="zh-CN" dirty="0"/>
+              <a:t>1mm</a:t>
+            </a:r>
+            <a:r>
+              <a:rPr lang="zh-CN" altLang="en-US" dirty="0"/>
+              <a:t>线宽 圆形</a:t>
+            </a:r>
+            <a:r>
+              <a:rPr lang="en-US" altLang="zh-CN" dirty="0"/>
+              <a:t>+</a:t>
+            </a:r>
+            <a:r>
+              <a:rPr lang="zh-CN" altLang="en-US" dirty="0"/>
+              <a:t>十字</a:t>
+            </a:r>
+            <a:endParaRPr lang="en-US" altLang="zh-CN" dirty="0"/>
+          </a:p>
+          <a:p>
+            <a:r>
+              <a:rPr lang="zh-CN" altLang="en-US" dirty="0"/>
+              <a:t>最下半径</a:t>
+            </a:r>
+            <a:r>
+              <a:rPr lang="en-US" altLang="zh-CN" dirty="0"/>
+              <a:t>4.5cm</a:t>
+            </a:r>
+            <a:endParaRPr lang="zh-CN" altLang="en-US" dirty="0"/>
+          </a:p>
+        </p:txBody>
+      </p:sp>
+      <p:grpSp>
+        <p:nvGrpSpPr>
+          <p:cNvPr id="6" name="组合 5">
+            <a:extLst>
+              <a:ext uri="{FF2B5EF4-FFF2-40B4-BE49-F238E27FC236}">
+                <a16:creationId xmlns:a16="http://schemas.microsoft.com/office/drawing/2014/main" id="{470D8E2F-27CB-4AF6-88B1-9443B46B899E}"/>
+              </a:ext>
+            </a:extLst>
+          </p:cNvPr>
+          <p:cNvGrpSpPr/>
+          <p:nvPr/>
+        </p:nvGrpSpPr>
+        <p:grpSpPr>
+          <a:xfrm>
+            <a:off x="5147442" y="529680"/>
+            <a:ext cx="5974080" cy="4572000"/>
+            <a:chOff x="5147442" y="529680"/>
+            <a:chExt cx="5974080" cy="4572000"/>
+          </a:xfrm>
+        </p:grpSpPr>
+        <p:sp>
+          <p:nvSpPr>
+            <p:cNvPr id="7" name="矩形 6">
+              <a:extLst>
+                <a:ext uri="{FF2B5EF4-FFF2-40B4-BE49-F238E27FC236}">
+                  <a16:creationId xmlns:a16="http://schemas.microsoft.com/office/drawing/2014/main" id="{61AD18E2-0F08-41F9-8739-EBB3CE6A12D2}"/>
+                </a:ext>
+              </a:extLst>
+            </p:cNvPr>
+            <p:cNvSpPr/>
+            <p:nvPr/>
+          </p:nvSpPr>
+          <p:spPr>
+            <a:xfrm>
+              <a:off x="5147442" y="529680"/>
+              <a:ext cx="5974080" cy="4572000"/>
+            </a:xfrm>
+            <a:prstGeom prst="rect">
+              <a:avLst/>
+            </a:prstGeom>
+            <a:solidFill>
+              <a:schemeClr val="bg1"/>
+            </a:solidFill>
+            <a:ln>
+              <a:solidFill>
+                <a:schemeClr val="tx1"/>
+              </a:solidFill>
+            </a:ln>
+          </p:spPr>
+          <p:style>
+            <a:lnRef idx="2">
+              <a:schemeClr val="accent1">
+                <a:shade val="50000"/>
+              </a:schemeClr>
+            </a:lnRef>
+            <a:fillRef idx="1">
+              <a:schemeClr val="accent1"/>
+            </a:fillRef>
+            <a:effectRef idx="0">
+              <a:schemeClr val="accent1"/>
+            </a:effectRef>
+            <a:fontRef idx="minor">
+              <a:schemeClr val="lt1"/>
+            </a:fontRef>
+          </p:style>
+          <p:txBody>
+            <a:bodyPr rtlCol="0" anchor="ctr"/>
+            <a:lstStyle/>
+            <a:p>
+              <a:pPr algn="ctr"/>
+              <a:endParaRPr lang="zh-CN" altLang="en-US"/>
+            </a:p>
+          </p:txBody>
+        </p:sp>
+        <p:sp>
+          <p:nvSpPr>
+            <p:cNvPr id="4" name="流程图: 接点 3">
+              <a:extLst>
+                <a:ext uri="{FF2B5EF4-FFF2-40B4-BE49-F238E27FC236}">
+                  <a16:creationId xmlns:a16="http://schemas.microsoft.com/office/drawing/2014/main" id="{3CC3B8DD-BF4F-46D2-B9D5-6E2F4C693C28}"/>
+                </a:ext>
+              </a:extLst>
+            </p:cNvPr>
+            <p:cNvSpPr/>
+            <p:nvPr/>
+          </p:nvSpPr>
+          <p:spPr>
+            <a:xfrm>
+              <a:off x="6334482" y="1015680"/>
+              <a:ext cx="3600000" cy="3600000"/>
+            </a:xfrm>
+            <a:prstGeom prst="flowChartConnector">
+              <a:avLst/>
+            </a:prstGeom>
+            <a:noFill/>
+            <a:ln w="25400">
+              <a:solidFill>
+                <a:schemeClr val="tx1"/>
+              </a:solidFill>
+            </a:ln>
+          </p:spPr>
+          <p:style>
+            <a:lnRef idx="2">
+              <a:schemeClr val="accent1">
+                <a:shade val="50000"/>
+              </a:schemeClr>
+            </a:lnRef>
+            <a:fillRef idx="1">
+              <a:schemeClr val="accent1"/>
+            </a:fillRef>
+            <a:effectRef idx="0">
+              <a:schemeClr val="accent1"/>
+            </a:effectRef>
+            <a:fontRef idx="minor">
+              <a:schemeClr val="lt1"/>
+            </a:fontRef>
+          </p:style>
+          <p:txBody>
+            <a:bodyPr rtlCol="0" anchor="ctr"/>
+            <a:lstStyle/>
+            <a:p>
+              <a:pPr algn="ctr"/>
+              <a:endParaRPr lang="zh-CN" altLang="en-US"/>
+            </a:p>
+          </p:txBody>
+        </p:sp>
+        <p:sp>
+          <p:nvSpPr>
+            <p:cNvPr id="9" name="流程图: 接点 8">
+              <a:extLst>
+                <a:ext uri="{FF2B5EF4-FFF2-40B4-BE49-F238E27FC236}">
+                  <a16:creationId xmlns:a16="http://schemas.microsoft.com/office/drawing/2014/main" id="{C01A70EB-F916-4695-88EC-7129624952EC}"/>
+                </a:ext>
+              </a:extLst>
+            </p:cNvPr>
+            <p:cNvSpPr/>
+            <p:nvPr/>
+          </p:nvSpPr>
+          <p:spPr>
+            <a:xfrm>
+              <a:off x="6694482" y="1375680"/>
+              <a:ext cx="2880000" cy="2880000"/>
+            </a:xfrm>
+            <a:prstGeom prst="flowChartConnector">
+              <a:avLst/>
+            </a:prstGeom>
+            <a:noFill/>
+            <a:ln w="25400">
+              <a:solidFill>
+                <a:schemeClr val="tx1"/>
+              </a:solidFill>
+            </a:ln>
+          </p:spPr>
+          <p:style>
+            <a:lnRef idx="2">
+              <a:schemeClr val="accent1">
+                <a:shade val="50000"/>
+              </a:schemeClr>
+            </a:lnRef>
+            <a:fillRef idx="1">
+              <a:schemeClr val="accent1"/>
+            </a:fillRef>
+            <a:effectRef idx="0">
+              <a:schemeClr val="accent1"/>
+            </a:effectRef>
+            <a:fontRef idx="minor">
+              <a:schemeClr val="lt1"/>
+            </a:fontRef>
+          </p:style>
+          <p:txBody>
+            <a:bodyPr rtlCol="0" anchor="ctr"/>
+            <a:lstStyle/>
+            <a:p>
+              <a:pPr algn="ctr"/>
+              <a:endParaRPr lang="zh-CN" altLang="en-US"/>
+            </a:p>
+          </p:txBody>
+        </p:sp>
+        <p:sp>
+          <p:nvSpPr>
+            <p:cNvPr id="10" name="流程图: 接点 9">
+              <a:extLst>
+                <a:ext uri="{FF2B5EF4-FFF2-40B4-BE49-F238E27FC236}">
+                  <a16:creationId xmlns:a16="http://schemas.microsoft.com/office/drawing/2014/main" id="{4210E950-9BB1-4978-A57E-C78DEF55612C}"/>
+                </a:ext>
+              </a:extLst>
+            </p:cNvPr>
+            <p:cNvSpPr/>
+            <p:nvPr/>
+          </p:nvSpPr>
+          <p:spPr>
+            <a:xfrm>
+              <a:off x="7054482" y="1735680"/>
+              <a:ext cx="2160000" cy="2160000"/>
+            </a:xfrm>
+            <a:prstGeom prst="flowChartConnector">
+              <a:avLst/>
+            </a:prstGeom>
+            <a:noFill/>
+            <a:ln w="25400">
+              <a:solidFill>
+                <a:schemeClr val="tx1"/>
+              </a:solidFill>
+            </a:ln>
+          </p:spPr>
+          <p:style>
+            <a:lnRef idx="2">
+              <a:schemeClr val="accent1">
+                <a:shade val="50000"/>
+              </a:schemeClr>
+            </a:lnRef>
+            <a:fillRef idx="1">
+              <a:schemeClr val="accent1"/>
+            </a:fillRef>
+            <a:effectRef idx="0">
+              <a:schemeClr val="accent1"/>
+            </a:effectRef>
+            <a:fontRef idx="minor">
+              <a:schemeClr val="lt1"/>
+            </a:fontRef>
+          </p:style>
+          <p:txBody>
+            <a:bodyPr rtlCol="0" anchor="ctr"/>
+            <a:lstStyle/>
+            <a:p>
+              <a:pPr algn="ctr"/>
+              <a:endParaRPr lang="zh-CN" altLang="en-US"/>
+            </a:p>
+          </p:txBody>
+        </p:sp>
+        <p:sp>
+          <p:nvSpPr>
+            <p:cNvPr id="11" name="流程图: 接点 10">
+              <a:extLst>
+                <a:ext uri="{FF2B5EF4-FFF2-40B4-BE49-F238E27FC236}">
+                  <a16:creationId xmlns:a16="http://schemas.microsoft.com/office/drawing/2014/main" id="{91DABCCD-C021-478B-84AE-1F3868C74A54}"/>
+                </a:ext>
+              </a:extLst>
+            </p:cNvPr>
+            <p:cNvSpPr/>
+            <p:nvPr/>
+          </p:nvSpPr>
+          <p:spPr>
+            <a:xfrm>
+              <a:off x="7414482" y="2095680"/>
+              <a:ext cx="1440000" cy="1440000"/>
+            </a:xfrm>
+            <a:prstGeom prst="flowChartConnector">
+              <a:avLst/>
+            </a:prstGeom>
+            <a:noFill/>
+            <a:ln w="25400">
+              <a:solidFill>
+                <a:schemeClr val="tx1"/>
+              </a:solidFill>
+            </a:ln>
+          </p:spPr>
+          <p:style>
+            <a:lnRef idx="2">
+              <a:schemeClr val="accent1">
+                <a:shade val="50000"/>
+              </a:schemeClr>
+            </a:lnRef>
+            <a:fillRef idx="1">
+              <a:schemeClr val="accent1"/>
+            </a:fillRef>
+            <a:effectRef idx="0">
+              <a:schemeClr val="accent1"/>
+            </a:effectRef>
+            <a:fontRef idx="minor">
+              <a:schemeClr val="lt1"/>
+            </a:fontRef>
+          </p:style>
+          <p:txBody>
+            <a:bodyPr rtlCol="0" anchor="ctr"/>
+            <a:lstStyle/>
+            <a:p>
+              <a:pPr algn="ctr"/>
+              <a:endParaRPr lang="zh-CN" altLang="en-US"/>
+            </a:p>
+          </p:txBody>
+        </p:sp>
+        <p:sp>
+          <p:nvSpPr>
+            <p:cNvPr id="13" name="流程图: 接点 12">
+              <a:extLst>
+                <a:ext uri="{FF2B5EF4-FFF2-40B4-BE49-F238E27FC236}">
+                  <a16:creationId xmlns:a16="http://schemas.microsoft.com/office/drawing/2014/main" id="{62AB4E7B-BED3-4F34-9095-EBFD76AFC7FE}"/>
+                </a:ext>
+              </a:extLst>
+            </p:cNvPr>
+            <p:cNvSpPr/>
+            <p:nvPr/>
+          </p:nvSpPr>
+          <p:spPr>
+            <a:xfrm>
+              <a:off x="8080482" y="2761680"/>
+              <a:ext cx="108000" cy="108000"/>
+            </a:xfrm>
+            <a:prstGeom prst="flowChartConnector">
+              <a:avLst/>
+            </a:prstGeom>
+            <a:noFill/>
+            <a:ln w="25400">
+              <a:solidFill>
+                <a:schemeClr val="tx1"/>
+              </a:solidFill>
+            </a:ln>
+          </p:spPr>
+          <p:style>
+            <a:lnRef idx="2">
+              <a:schemeClr val="accent1">
+                <a:shade val="50000"/>
+              </a:schemeClr>
+            </a:lnRef>
+            <a:fillRef idx="1">
+              <a:schemeClr val="accent1"/>
+            </a:fillRef>
+            <a:effectRef idx="0">
+              <a:schemeClr val="accent1"/>
+            </a:effectRef>
+            <a:fontRef idx="minor">
+              <a:schemeClr val="lt1"/>
+            </a:fontRef>
+          </p:style>
+          <p:txBody>
+            <a:bodyPr rtlCol="0" anchor="ctr"/>
+            <a:lstStyle/>
+            <a:p>
+              <a:pPr algn="ctr"/>
+              <a:endParaRPr lang="zh-CN" altLang="en-US"/>
+            </a:p>
+          </p:txBody>
+        </p:sp>
+        <p:cxnSp>
+          <p:nvCxnSpPr>
+            <p:cNvPr id="12" name="直接连接符 11">
+              <a:extLst>
+                <a:ext uri="{FF2B5EF4-FFF2-40B4-BE49-F238E27FC236}">
+                  <a16:creationId xmlns:a16="http://schemas.microsoft.com/office/drawing/2014/main" id="{BC8A5755-52D4-4068-BA4D-2403C467E74A}"/>
+                </a:ext>
+              </a:extLst>
+            </p:cNvPr>
+            <p:cNvCxnSpPr>
+              <a:cxnSpLocks/>
+            </p:cNvCxnSpPr>
+            <p:nvPr/>
+          </p:nvCxnSpPr>
+          <p:spPr>
+            <a:xfrm flipH="1">
+              <a:off x="6334482" y="2815680"/>
+              <a:ext cx="3600000" cy="0"/>
+            </a:xfrm>
+            <a:prstGeom prst="line">
+              <a:avLst/>
+            </a:prstGeom>
+            <a:ln w="38100"/>
+          </p:spPr>
+          <p:style>
+            <a:lnRef idx="1">
+              <a:schemeClr val="dk1"/>
+            </a:lnRef>
+            <a:fillRef idx="0">
+              <a:schemeClr val="dk1"/>
+            </a:fillRef>
+            <a:effectRef idx="0">
+              <a:schemeClr val="dk1"/>
+            </a:effectRef>
+            <a:fontRef idx="minor">
+              <a:schemeClr val="tx1"/>
+            </a:fontRef>
+          </p:style>
+        </p:cxnSp>
+        <p:cxnSp>
+          <p:nvCxnSpPr>
+            <p:cNvPr id="14" name="直接连接符 13">
+              <a:extLst>
+                <a:ext uri="{FF2B5EF4-FFF2-40B4-BE49-F238E27FC236}">
+                  <a16:creationId xmlns:a16="http://schemas.microsoft.com/office/drawing/2014/main" id="{5F11CD3A-B6C0-49C5-855F-B034120190E1}"/>
+                </a:ext>
+              </a:extLst>
+            </p:cNvPr>
+            <p:cNvCxnSpPr>
+              <a:cxnSpLocks/>
+              <a:stCxn id="4" idx="4"/>
+              <a:endCxn id="4" idx="0"/>
+            </p:cNvCxnSpPr>
+            <p:nvPr/>
+          </p:nvCxnSpPr>
+          <p:spPr>
+            <a:xfrm flipV="1">
+              <a:off x="8134482" y="1015680"/>
+              <a:ext cx="0" cy="3600000"/>
+            </a:xfrm>
+            <a:prstGeom prst="line">
+              <a:avLst/>
+            </a:prstGeom>
+            <a:ln w="38100"/>
+          </p:spPr>
+          <p:style>
+            <a:lnRef idx="1">
+              <a:schemeClr val="dk1"/>
+            </a:lnRef>
+            <a:fillRef idx="0">
+              <a:schemeClr val="dk1"/>
+            </a:fillRef>
+            <a:effectRef idx="0">
+              <a:schemeClr val="dk1"/>
+            </a:effectRef>
+            <a:fontRef idx="minor">
+              <a:schemeClr val="tx1"/>
+            </a:fontRef>
+          </p:style>
+        </p:cxnSp>
+      </p:grpSp>
+    </p:spTree>
+    <p:extLst>
+      <p:ext uri="{BB962C8B-B14F-4D97-AF65-F5344CB8AC3E}">
+        <p14:creationId xmlns:p14="http://schemas.microsoft.com/office/powerpoint/2010/main" val="4085143947"/>
       </p:ext>
     </p:extLst>
   </p:cSld>

</xml_diff>